<commit_message>
update Iteration 1 assignment
</commit_message>
<xml_diff>
--- a/web/HTTP-in-Action.pptx
+++ b/web/HTTP-in-Action.pptx
@@ -272,7 +272,7 @@
           </a:bodyPr>
           <a:p>
             <a:pPr algn="r"/>
-            <a:fld id="{D88A03AC-D54D-4D42-A5A0-16A4058BAFFF}" type="slidenum">
+            <a:fld id="{ED15D874-6F2E-4F35-9CB7-AEE3FF9B39E4}" type="slidenum">
               <a:rPr b="0" lang="en-US" sz="1400" spc="-1" strike="noStrike">
                 <a:latin typeface="Times New Roman"/>
               </a:rPr>
@@ -320,7 +320,7 @@
         <p:spPr>
           <a:xfrm>
             <a:off x="2143080" y="695160"/>
-            <a:ext cx="2570760" cy="3427920"/>
+            <a:ext cx="2570400" cy="3427560"/>
           </a:xfrm>
           <a:prstGeom prst="rect">
             <a:avLst/>
@@ -336,7 +336,7 @@
         <p:spPr>
           <a:xfrm>
             <a:off x="685800" y="4343400"/>
-            <a:ext cx="5485320" cy="4113720"/>
+            <a:ext cx="5484960" cy="4113360"/>
           </a:xfrm>
           <a:custGeom>
             <a:avLst/>
@@ -411,7 +411,7 @@
         <p:spPr>
           <a:xfrm>
             <a:off x="2143080" y="695160"/>
-            <a:ext cx="2570760" cy="3427920"/>
+            <a:ext cx="2570400" cy="3427560"/>
           </a:xfrm>
           <a:prstGeom prst="rect">
             <a:avLst/>
@@ -427,7 +427,7 @@
         <p:spPr>
           <a:xfrm>
             <a:off x="685800" y="4343400"/>
-            <a:ext cx="5485320" cy="4113720"/>
+            <a:ext cx="5484960" cy="4113360"/>
           </a:xfrm>
           <a:custGeom>
             <a:avLst/>
@@ -502,7 +502,7 @@
         <p:spPr>
           <a:xfrm>
             <a:off x="2143080" y="695160"/>
-            <a:ext cx="2570760" cy="3427920"/>
+            <a:ext cx="2570400" cy="3427560"/>
           </a:xfrm>
           <a:prstGeom prst="rect">
             <a:avLst/>
@@ -518,7 +518,7 @@
         <p:spPr>
           <a:xfrm>
             <a:off x="685800" y="4343400"/>
-            <a:ext cx="5485320" cy="4113720"/>
+            <a:ext cx="5484960" cy="4113360"/>
           </a:xfrm>
           <a:custGeom>
             <a:avLst/>
@@ -593,7 +593,7 @@
         <p:spPr>
           <a:xfrm>
             <a:off x="2143080" y="695160"/>
-            <a:ext cx="2570760" cy="3427920"/>
+            <a:ext cx="2570400" cy="3427560"/>
           </a:xfrm>
           <a:prstGeom prst="rect">
             <a:avLst/>
@@ -609,7 +609,7 @@
         <p:spPr>
           <a:xfrm>
             <a:off x="685800" y="4343400"/>
-            <a:ext cx="5485320" cy="4113720"/>
+            <a:ext cx="5484960" cy="4113360"/>
           </a:xfrm>
           <a:custGeom>
             <a:avLst/>
@@ -684,7 +684,7 @@
         <p:spPr>
           <a:xfrm>
             <a:off x="2143080" y="695160"/>
-            <a:ext cx="2570760" cy="3427920"/>
+            <a:ext cx="2570400" cy="3427560"/>
           </a:xfrm>
           <a:prstGeom prst="rect">
             <a:avLst/>
@@ -700,7 +700,7 @@
         <p:spPr>
           <a:xfrm>
             <a:off x="685800" y="4343400"/>
-            <a:ext cx="5485320" cy="4113720"/>
+            <a:ext cx="5484960" cy="4113360"/>
           </a:xfrm>
           <a:custGeom>
             <a:avLst/>
@@ -775,7 +775,7 @@
         <p:spPr>
           <a:xfrm>
             <a:off x="2143080" y="695160"/>
-            <a:ext cx="2570760" cy="3427920"/>
+            <a:ext cx="2570400" cy="3427560"/>
           </a:xfrm>
           <a:prstGeom prst="rect">
             <a:avLst/>
@@ -791,7 +791,7 @@
         <p:spPr>
           <a:xfrm>
             <a:off x="685800" y="4343400"/>
-            <a:ext cx="5485320" cy="4113720"/>
+            <a:ext cx="5484960" cy="4113360"/>
           </a:xfrm>
           <a:custGeom>
             <a:avLst/>
@@ -866,7 +866,7 @@
         <p:spPr>
           <a:xfrm>
             <a:off x="2143080" y="695160"/>
-            <a:ext cx="2570760" cy="3427920"/>
+            <a:ext cx="2570400" cy="3427560"/>
           </a:xfrm>
           <a:prstGeom prst="rect">
             <a:avLst/>
@@ -882,7 +882,7 @@
         <p:spPr>
           <a:xfrm>
             <a:off x="685800" y="4343400"/>
-            <a:ext cx="5485320" cy="4113720"/>
+            <a:ext cx="5484960" cy="4113360"/>
           </a:xfrm>
           <a:custGeom>
             <a:avLst/>
@@ -957,7 +957,7 @@
         <p:spPr>
           <a:xfrm>
             <a:off x="2143080" y="695160"/>
-            <a:ext cx="2570760" cy="3427920"/>
+            <a:ext cx="2570400" cy="3427560"/>
           </a:xfrm>
           <a:prstGeom prst="rect">
             <a:avLst/>
@@ -973,7 +973,7 @@
         <p:spPr>
           <a:xfrm>
             <a:off x="685800" y="4343400"/>
-            <a:ext cx="5485320" cy="4113720"/>
+            <a:ext cx="5484960" cy="4113360"/>
           </a:xfrm>
           <a:custGeom>
             <a:avLst/>
@@ -1048,7 +1048,7 @@
         <p:spPr>
           <a:xfrm>
             <a:off x="2143080" y="695160"/>
-            <a:ext cx="2570760" cy="3427920"/>
+            <a:ext cx="2570400" cy="3427560"/>
           </a:xfrm>
           <a:prstGeom prst="rect">
             <a:avLst/>
@@ -1064,7 +1064,7 @@
         <p:spPr>
           <a:xfrm>
             <a:off x="685800" y="4343400"/>
-            <a:ext cx="5485320" cy="4113720"/>
+            <a:ext cx="5484960" cy="4113360"/>
           </a:xfrm>
           <a:custGeom>
             <a:avLst/>
@@ -1139,7 +1139,7 @@
         <p:spPr>
           <a:xfrm>
             <a:off x="2143080" y="695160"/>
-            <a:ext cx="2570760" cy="3427920"/>
+            <a:ext cx="2570400" cy="3427560"/>
           </a:xfrm>
           <a:prstGeom prst="rect">
             <a:avLst/>
@@ -1155,7 +1155,7 @@
         <p:spPr>
           <a:xfrm>
             <a:off x="685800" y="4343400"/>
-            <a:ext cx="5485320" cy="4113720"/>
+            <a:ext cx="5484960" cy="4113360"/>
           </a:xfrm>
           <a:custGeom>
             <a:avLst/>
@@ -1230,7 +1230,7 @@
         <p:spPr>
           <a:xfrm>
             <a:off x="-11798280" y="-11796840"/>
-            <a:ext cx="11768760" cy="12462480"/>
+            <a:ext cx="11768400" cy="12462120"/>
           </a:xfrm>
           <a:prstGeom prst="rect">
             <a:avLst/>
@@ -1246,7 +1246,7 @@
         <p:spPr>
           <a:xfrm>
             <a:off x="685800" y="4343400"/>
-            <a:ext cx="5455080" cy="4083480"/>
+            <a:ext cx="5454720" cy="4083120"/>
           </a:xfrm>
           <a:custGeom>
             <a:avLst/>
@@ -1321,7 +1321,7 @@
         <p:spPr>
           <a:xfrm>
             <a:off x="-11798280" y="-11796840"/>
-            <a:ext cx="11768760" cy="12462480"/>
+            <a:ext cx="11768400" cy="12462120"/>
           </a:xfrm>
           <a:prstGeom prst="rect">
             <a:avLst/>
@@ -1337,7 +1337,7 @@
         <p:spPr>
           <a:xfrm>
             <a:off x="685800" y="4343400"/>
-            <a:ext cx="5455080" cy="4083480"/>
+            <a:ext cx="5454720" cy="4083120"/>
           </a:xfrm>
           <a:custGeom>
             <a:avLst/>
@@ -1412,7 +1412,7 @@
         <p:spPr>
           <a:xfrm>
             <a:off x="2143080" y="695160"/>
-            <a:ext cx="2570760" cy="3427920"/>
+            <a:ext cx="2570400" cy="3427560"/>
           </a:xfrm>
           <a:prstGeom prst="rect">
             <a:avLst/>
@@ -1428,7 +1428,7 @@
         <p:spPr>
           <a:xfrm>
             <a:off x="685800" y="4343400"/>
-            <a:ext cx="5485320" cy="4113720"/>
+            <a:ext cx="5484960" cy="4113360"/>
           </a:xfrm>
           <a:custGeom>
             <a:avLst/>
@@ -1503,7 +1503,7 @@
         <p:spPr>
           <a:xfrm>
             <a:off x="-11798280" y="-11796840"/>
-            <a:ext cx="11768760" cy="12462480"/>
+            <a:ext cx="11768400" cy="12462120"/>
           </a:xfrm>
           <a:prstGeom prst="rect">
             <a:avLst/>
@@ -1519,7 +1519,7 @@
         <p:spPr>
           <a:xfrm>
             <a:off x="685800" y="4343400"/>
-            <a:ext cx="5455080" cy="4083480"/>
+            <a:ext cx="5454720" cy="4083120"/>
           </a:xfrm>
           <a:custGeom>
             <a:avLst/>
@@ -1594,7 +1594,7 @@
         <p:spPr>
           <a:xfrm>
             <a:off x="2143080" y="695160"/>
-            <a:ext cx="2570760" cy="3427920"/>
+            <a:ext cx="2570400" cy="3427560"/>
           </a:xfrm>
           <a:prstGeom prst="rect">
             <a:avLst/>
@@ -1610,7 +1610,7 @@
         <p:spPr>
           <a:xfrm>
             <a:off x="685800" y="4343400"/>
-            <a:ext cx="5485320" cy="4113720"/>
+            <a:ext cx="5484960" cy="4113360"/>
           </a:xfrm>
           <a:custGeom>
             <a:avLst/>
@@ -1685,7 +1685,7 @@
         <p:spPr>
           <a:xfrm>
             <a:off x="-11798280" y="-11796840"/>
-            <a:ext cx="11768760" cy="12462480"/>
+            <a:ext cx="11768400" cy="12462120"/>
           </a:xfrm>
           <a:prstGeom prst="rect">
             <a:avLst/>
@@ -1701,7 +1701,7 @@
         <p:spPr>
           <a:xfrm>
             <a:off x="685800" y="4343400"/>
-            <a:ext cx="5455080" cy="4083480"/>
+            <a:ext cx="5454720" cy="4083120"/>
           </a:xfrm>
           <a:custGeom>
             <a:avLst/>
@@ -1776,7 +1776,7 @@
         <p:spPr>
           <a:xfrm>
             <a:off x="-11798280" y="-11796840"/>
-            <a:ext cx="11768760" cy="12462480"/>
+            <a:ext cx="11768400" cy="12462120"/>
           </a:xfrm>
           <a:prstGeom prst="rect">
             <a:avLst/>
@@ -1792,7 +1792,7 @@
         <p:spPr>
           <a:xfrm>
             <a:off x="685800" y="4343400"/>
-            <a:ext cx="5455080" cy="4083480"/>
+            <a:ext cx="5454720" cy="4083120"/>
           </a:xfrm>
           <a:custGeom>
             <a:avLst/>
@@ -1867,7 +1867,7 @@
         <p:spPr>
           <a:xfrm>
             <a:off x="-11798280" y="-11796840"/>
-            <a:ext cx="11768760" cy="12462480"/>
+            <a:ext cx="11768400" cy="12462120"/>
           </a:xfrm>
           <a:prstGeom prst="rect">
             <a:avLst/>
@@ -1883,7 +1883,7 @@
         <p:spPr>
           <a:xfrm>
             <a:off x="685800" y="4343400"/>
-            <a:ext cx="5455080" cy="4083480"/>
+            <a:ext cx="5454720" cy="4083120"/>
           </a:xfrm>
           <a:custGeom>
             <a:avLst/>
@@ -1958,7 +1958,7 @@
         <p:spPr>
           <a:xfrm>
             <a:off x="-11798280" y="-11796840"/>
-            <a:ext cx="11768760" cy="12462480"/>
+            <a:ext cx="11768400" cy="12462120"/>
           </a:xfrm>
           <a:prstGeom prst="rect">
             <a:avLst/>
@@ -1974,7 +1974,7 @@
         <p:spPr>
           <a:xfrm>
             <a:off x="685800" y="4343400"/>
-            <a:ext cx="5455080" cy="4083480"/>
+            <a:ext cx="5454720" cy="4083120"/>
           </a:xfrm>
           <a:custGeom>
             <a:avLst/>
@@ -6120,9 +6120,9 @@
         <p:grpSpPr>
           <a:xfrm>
             <a:off x="0" y="2438280"/>
-            <a:ext cx="8949240" cy="992880"/>
+            <a:ext cx="8948880" cy="992520"/>
             <a:chOff x="0" y="2438280"/>
-            <a:chExt cx="8949240" cy="992880"/>
+            <a:chExt cx="8948880" cy="992520"/>
           </a:xfrm>
         </p:grpSpPr>
         <p:grpSp>
@@ -6134,9 +6134,9 @@
           <p:grpSpPr>
             <a:xfrm>
               <a:off x="290520" y="2546280"/>
-              <a:ext cx="651240" cy="415080"/>
+              <a:ext cx="650880" cy="414720"/>
               <a:chOff x="290520" y="2546280"/>
-              <a:chExt cx="651240" cy="415080"/>
+              <a:chExt cx="650880" cy="414720"/>
             </a:xfrm>
           </p:grpSpPr>
           <p:sp>
@@ -6148,7 +6148,7 @@
             <p:spPr>
               <a:xfrm>
                 <a:off x="290520" y="2546280"/>
-                <a:ext cx="378360" cy="415080"/>
+                <a:ext cx="378000" cy="414720"/>
               </a:xfrm>
               <a:prstGeom prst="rect">
                 <a:avLst/>
@@ -6176,7 +6176,7 @@
             <p:spPr>
               <a:xfrm>
                 <a:off x="673200" y="2546280"/>
-                <a:ext cx="268560" cy="415080"/>
+                <a:ext cx="268200" cy="414720"/>
               </a:xfrm>
               <a:prstGeom prst="rect">
                 <a:avLst/>
@@ -6213,9 +6213,9 @@
           <p:grpSpPr>
             <a:xfrm>
               <a:off x="414360" y="2968560"/>
-              <a:ext cx="677880" cy="415080"/>
+              <a:ext cx="677520" cy="414720"/>
               <a:chOff x="414360" y="2968560"/>
-              <a:chExt cx="677880" cy="415080"/>
+              <a:chExt cx="677520" cy="414720"/>
             </a:xfrm>
           </p:grpSpPr>
           <p:sp>
@@ -6227,7 +6227,7 @@
             <p:spPr>
               <a:xfrm>
                 <a:off x="414360" y="2968560"/>
-                <a:ext cx="420480" cy="415080"/>
+                <a:ext cx="420120" cy="414720"/>
               </a:xfrm>
               <a:prstGeom prst="rect">
                 <a:avLst/>
@@ -6255,7 +6255,7 @@
             <p:spPr>
               <a:xfrm>
                 <a:off x="783360" y="2968560"/>
-                <a:ext cx="308880" cy="415080"/>
+                <a:ext cx="308520" cy="414720"/>
               </a:xfrm>
               <a:prstGeom prst="rect">
                 <a:avLst/>
@@ -6292,7 +6292,7 @@
           <p:spPr>
             <a:xfrm>
               <a:off x="0" y="2895480"/>
-              <a:ext cx="500400" cy="362520"/>
+              <a:ext cx="500040" cy="362160"/>
             </a:xfrm>
             <a:prstGeom prst="rect">
               <a:avLst/>
@@ -6328,7 +6328,7 @@
           <p:spPr>
             <a:xfrm>
               <a:off x="635040" y="2438280"/>
-              <a:ext cx="360" cy="992880"/>
+              <a:ext cx="360" cy="992520"/>
             </a:xfrm>
             <a:prstGeom prst="rect">
               <a:avLst/>
@@ -6355,8 +6355,8 @@
           </p:nvSpPr>
           <p:spPr>
             <a:xfrm flipV="1">
-              <a:off x="316080" y="3256560"/>
-              <a:ext cx="8633160" cy="360"/>
+              <a:off x="316080" y="3255480"/>
+              <a:ext cx="8632800" cy="360"/>
             </a:xfrm>
             <a:prstGeom prst="rect">
               <a:avLst/>
@@ -6653,9 +6653,9 @@
         <p:grpSpPr>
           <a:xfrm>
             <a:off x="189000" y="368280"/>
-            <a:ext cx="8166600" cy="992880"/>
+            <a:ext cx="8166240" cy="992520"/>
             <a:chOff x="189000" y="368280"/>
-            <a:chExt cx="8166600" cy="992880"/>
+            <a:chExt cx="8166240" cy="992520"/>
           </a:xfrm>
         </p:grpSpPr>
         <p:sp>
@@ -6667,7 +6667,7 @@
           <p:spPr>
             <a:xfrm>
               <a:off x="507960" y="368280"/>
-              <a:ext cx="360" cy="992880"/>
+              <a:ext cx="360" cy="992520"/>
             </a:xfrm>
             <a:prstGeom prst="rect">
               <a:avLst/>
@@ -6695,7 +6695,7 @@
           <p:spPr>
             <a:xfrm>
               <a:off x="189000" y="1158840"/>
-              <a:ext cx="8166600" cy="360"/>
+              <a:ext cx="8166240" cy="360"/>
             </a:xfrm>
             <a:prstGeom prst="rect">
               <a:avLst/>
@@ -6992,9 +6992,9 @@
         <p:grpSpPr>
           <a:xfrm>
             <a:off x="189000" y="368280"/>
-            <a:ext cx="8166600" cy="992880"/>
+            <a:ext cx="8166240" cy="992520"/>
             <a:chOff x="189000" y="368280"/>
-            <a:chExt cx="8166600" cy="992880"/>
+            <a:chExt cx="8166240" cy="992520"/>
           </a:xfrm>
         </p:grpSpPr>
         <p:sp>
@@ -7006,7 +7006,7 @@
           <p:spPr>
             <a:xfrm>
               <a:off x="507960" y="368280"/>
-              <a:ext cx="360" cy="992880"/>
+              <a:ext cx="360" cy="992520"/>
             </a:xfrm>
             <a:prstGeom prst="rect">
               <a:avLst/>
@@ -7034,7 +7034,7 @@
           <p:spPr>
             <a:xfrm>
               <a:off x="189000" y="1158840"/>
-              <a:ext cx="8166600" cy="360"/>
+              <a:ext cx="8166240" cy="360"/>
             </a:xfrm>
             <a:prstGeom prst="rect">
               <a:avLst/>
@@ -7331,7 +7331,7 @@
         <p:spPr>
           <a:xfrm>
             <a:off x="990720" y="1676160"/>
-            <a:ext cx="7445880" cy="1460880"/>
+            <a:ext cx="7445520" cy="1460520"/>
           </a:xfrm>
           <a:prstGeom prst="rect">
             <a:avLst/>
@@ -7419,7 +7419,7 @@
         <p:spPr>
           <a:xfrm>
             <a:off x="1371600" y="3886200"/>
-            <a:ext cx="6399720" cy="1751400"/>
+            <a:ext cx="6399360" cy="1751040"/>
           </a:xfrm>
           <a:prstGeom prst="rect">
             <a:avLst/>
@@ -7597,7 +7597,7 @@
         <p:spPr>
           <a:xfrm>
             <a:off x="611280" y="259920"/>
-            <a:ext cx="7863480" cy="807120"/>
+            <a:ext cx="7863120" cy="806760"/>
           </a:xfrm>
           <a:prstGeom prst="rect">
             <a:avLst/>
@@ -7682,7 +7682,7 @@
         <p:spPr>
           <a:xfrm>
             <a:off x="674640" y="1400040"/>
-            <a:ext cx="7863480" cy="5182200"/>
+            <a:ext cx="7863120" cy="5181840"/>
           </a:xfrm>
           <a:prstGeom prst="rect">
             <a:avLst/>
@@ -7703,7 +7703,7 @@
             <a:normAutofit/>
           </a:bodyPr>
           <a:p>
-            <a:pPr marL="342720" indent="-340200">
+            <a:pPr marL="342720" indent="-339840">
               <a:lnSpc>
                 <a:spcPct val="100000"/>
               </a:lnSpc>
@@ -7729,7 +7729,7 @@
             </a:endParaRPr>
           </a:p>
           <a:p>
-            <a:pPr marL="342720" indent="-340200">
+            <a:pPr marL="342720" indent="-339840">
               <a:lnSpc>
                 <a:spcPct val="100000"/>
               </a:lnSpc>
@@ -7745,7 +7745,7 @@
             </a:endParaRPr>
           </a:p>
           <a:p>
-            <a:pPr marL="342720" indent="-340200">
+            <a:pPr marL="342720" indent="-339840">
               <a:lnSpc>
                 <a:spcPct val="100000"/>
               </a:lnSpc>
@@ -7771,7 +7771,7 @@
             </a:endParaRPr>
           </a:p>
           <a:p>
-            <a:pPr marL="342720" indent="-340200">
+            <a:pPr marL="342720" indent="-339840">
               <a:lnSpc>
                 <a:spcPct val="100000"/>
               </a:lnSpc>
@@ -7797,7 +7797,7 @@
             </a:endParaRPr>
           </a:p>
           <a:p>
-            <a:pPr marL="342720" indent="-340200">
+            <a:pPr marL="342720" indent="-339840">
               <a:lnSpc>
                 <a:spcPct val="100000"/>
               </a:lnSpc>
@@ -7823,7 +7823,7 @@
             </a:endParaRPr>
           </a:p>
           <a:p>
-            <a:pPr marL="342720" indent="-340200">
+            <a:pPr marL="342720" indent="-339840">
               <a:lnSpc>
                 <a:spcPct val="100000"/>
               </a:lnSpc>
@@ -7849,7 +7849,7 @@
             </a:endParaRPr>
           </a:p>
           <a:p>
-            <a:pPr marL="342720" indent="-340200">
+            <a:pPr marL="342720" indent="-339840">
               <a:lnSpc>
                 <a:spcPct val="100000"/>
               </a:lnSpc>
@@ -7875,7 +7875,7 @@
             </a:endParaRPr>
           </a:p>
           <a:p>
-            <a:pPr marL="342720" indent="-340200">
+            <a:pPr marL="342720" indent="-339840">
               <a:lnSpc>
                 <a:spcPct val="100000"/>
               </a:lnSpc>
@@ -7901,7 +7901,7 @@
             </a:endParaRPr>
           </a:p>
           <a:p>
-            <a:pPr marL="342720" indent="-340200">
+            <a:pPr marL="342720" indent="-339840">
               <a:lnSpc>
                 <a:spcPct val="100000"/>
               </a:lnSpc>
@@ -7917,7 +7917,7 @@
             </a:endParaRPr>
           </a:p>
           <a:p>
-            <a:pPr marL="342720" indent="-340200">
+            <a:pPr marL="342720" indent="-339840">
               <a:lnSpc>
                 <a:spcPct val="100000"/>
               </a:lnSpc>
@@ -7953,7 +7953,7 @@
             </a:endParaRPr>
           </a:p>
           <a:p>
-            <a:pPr marL="342720" indent="-340200">
+            <a:pPr marL="342720" indent="-339840">
               <a:lnSpc>
                 <a:spcPct val="100000"/>
               </a:lnSpc>
@@ -8040,7 +8040,7 @@
         <p:spPr>
           <a:xfrm>
             <a:off x="1457280" y="1279440"/>
-            <a:ext cx="6771240" cy="2989800"/>
+            <a:ext cx="6770880" cy="2989440"/>
           </a:xfrm>
           <a:prstGeom prst="rect">
             <a:avLst/>
@@ -8059,7 +8059,7 @@
         <p:spPr>
           <a:xfrm>
             <a:off x="611280" y="259920"/>
-            <a:ext cx="7863480" cy="807120"/>
+            <a:ext cx="7863120" cy="806760"/>
           </a:xfrm>
           <a:prstGeom prst="rect">
             <a:avLst/>
@@ -8144,7 +8144,7 @@
         <p:spPr>
           <a:xfrm>
             <a:off x="674640" y="4022640"/>
-            <a:ext cx="7863480" cy="2377080"/>
+            <a:ext cx="7863120" cy="2743920"/>
           </a:xfrm>
           <a:prstGeom prst="rect">
             <a:avLst/>
@@ -8165,7 +8165,7 @@
             <a:normAutofit/>
           </a:bodyPr>
           <a:p>
-            <a:pPr marL="342720" indent="-340200" algn="ctr">
+            <a:pPr marL="342720" indent="-339840" algn="ctr">
               <a:lnSpc>
                 <a:spcPct val="100000"/>
               </a:lnSpc>
@@ -8191,7 +8191,7 @@
             </a:endParaRPr>
           </a:p>
           <a:p>
-            <a:pPr marL="342720" indent="-340200">
+            <a:pPr marL="342720" indent="-339840">
               <a:lnSpc>
                 <a:spcPct val="100000"/>
               </a:lnSpc>
@@ -8213,7 +8213,7 @@
               <a:t>You need to </a:t>
             </a:r>
             <a:r>
-              <a:rPr b="0" lang="en-US" sz="2400" spc="-1" strike="noStrike" u="sng">
+              <a:rPr b="1" lang="en-US" sz="2400" spc="-1" strike="noStrike" u="sng">
                 <a:solidFill>
                   <a:srgbClr val="000080"/>
                 </a:solidFill>
@@ -8258,7 +8258,7 @@
             </a:endParaRPr>
           </a:p>
           <a:p>
-            <a:pPr marL="342720" indent="-340200">
+            <a:pPr marL="342720" indent="-339840">
               <a:lnSpc>
                 <a:spcPct val="100000"/>
               </a:lnSpc>
@@ -8274,7 +8274,7 @@
             </a:endParaRPr>
           </a:p>
           <a:p>
-            <a:pPr marL="342720" indent="-340200">
+            <a:pPr marL="342720" indent="-339840">
               <a:lnSpc>
                 <a:spcPct val="100000"/>
               </a:lnSpc>
@@ -8293,7 +8293,7 @@
                 <a:latin typeface="Courier New"/>
                 <a:ea typeface="DejaVu Sans"/>
               </a:rPr>
-              <a:t>   </a:t>
+              <a:t>      </a:t>
             </a:r>
             <a:r>
               <a:rPr b="1" lang="en-US" sz="2400" spc="-1" strike="noStrike">
@@ -8304,6 +8304,78 @@
                 <a:ea typeface="DejaVu Sans"/>
               </a:rPr>
               <a:t>ncat  -v -l -p 8080</a:t>
+            </a:r>
+            <a:endParaRPr b="0" lang="en-US" sz="2400" spc="-1" strike="noStrike">
+              <a:latin typeface="Arial"/>
+            </a:endParaRPr>
+          </a:p>
+          <a:p>
+            <a:pPr marL="342720" indent="-339840">
+              <a:lnSpc>
+                <a:spcPct val="100000"/>
+              </a:lnSpc>
+              <a:spcBef>
+                <a:spcPts val="598"/>
+              </a:spcBef>
+              <a:tabLst>
+                <a:tab algn="l" pos="0"/>
+              </a:tabLst>
+            </a:pPr>
+            <a:endParaRPr b="0" lang="en-US" sz="2400" spc="-1" strike="noStrike">
+              <a:latin typeface="Arial"/>
+            </a:endParaRPr>
+          </a:p>
+          <a:p>
+            <a:pPr marL="342720" indent="-339840">
+              <a:lnSpc>
+                <a:spcPct val="100000"/>
+              </a:lnSpc>
+              <a:spcBef>
+                <a:spcPts val="598"/>
+              </a:spcBef>
+              <a:tabLst>
+                <a:tab algn="l" pos="0"/>
+              </a:tabLst>
+            </a:pPr>
+            <a:r>
+              <a:rPr b="1" lang="en-US" sz="2400" spc="-1" strike="noStrike">
+                <a:solidFill>
+                  <a:srgbClr val="000000"/>
+                </a:solidFill>
+                <a:latin typeface="Courier New"/>
+                <a:ea typeface="DejaVu Sans"/>
+              </a:rPr>
+              <a:t>FYI: ncat </a:t>
+            </a:r>
+            <a:r>
+              <a:rPr b="0" lang="en-US" sz="2400" spc="-1" strike="noStrike">
+                <a:solidFill>
+                  <a:srgbClr val="000000"/>
+                </a:solidFill>
+                <a:latin typeface="Arial"/>
+                <a:ea typeface="DejaVu Sans"/>
+              </a:rPr>
+              <a:t>has a  </a:t>
+            </a:r>
+            <a:r>
+              <a:rPr b="1" lang="en-US" sz="2400" spc="-1" strike="noStrike">
+                <a:solidFill>
+                  <a:srgbClr val="000000"/>
+                </a:solidFill>
+                <a:latin typeface="Courier New"/>
+                <a:ea typeface="DejaVu Sans"/>
+              </a:rPr>
+              <a:t>-k</a:t>
+            </a:r>
+            <a:r>
+              <a:rPr b="0" lang="en-US" sz="2400" spc="-1" strike="noStrike">
+                <a:solidFill>
+                  <a:srgbClr val="000000"/>
+                </a:solidFill>
+                <a:latin typeface="Arial"/>
+                <a:ea typeface="DejaVu Sans"/>
+              </a:rPr>
+              <a:t> (keep-open) option for this.</a:t>
             </a:r>
             <a:endParaRPr b="0" lang="en-US" sz="2400" spc="-1" strike="noStrike">
               <a:latin typeface="Arial"/>
@@ -8357,7 +8429,7 @@
         <p:spPr>
           <a:xfrm>
             <a:off x="611280" y="259920"/>
-            <a:ext cx="7863480" cy="807120"/>
+            <a:ext cx="7863120" cy="806760"/>
           </a:xfrm>
           <a:prstGeom prst="rect">
             <a:avLst/>
@@ -8442,7 +8514,7 @@
         <p:spPr>
           <a:xfrm>
             <a:off x="730080" y="3336480"/>
-            <a:ext cx="7863480" cy="2697840"/>
+            <a:ext cx="7863120" cy="2697480"/>
           </a:xfrm>
           <a:prstGeom prst="rect">
             <a:avLst/>
@@ -8463,7 +8535,7 @@
             <a:normAutofit/>
           </a:bodyPr>
           <a:p>
-            <a:pPr marL="342720" indent="-340200" algn="ctr">
+            <a:pPr marL="342720" indent="-339840" algn="ctr">
               <a:lnSpc>
                 <a:spcPct val="100000"/>
               </a:lnSpc>
@@ -8503,7 +8575,7 @@
         <p:spPr>
           <a:xfrm>
             <a:off x="1736640" y="1068480"/>
-            <a:ext cx="5485320" cy="1986480"/>
+            <a:ext cx="5484960" cy="1986120"/>
           </a:xfrm>
           <a:prstGeom prst="rect">
             <a:avLst/>
@@ -8559,7 +8631,7 @@
         <p:spPr>
           <a:xfrm>
             <a:off x="365040" y="68040"/>
-            <a:ext cx="8320680" cy="1189440"/>
+            <a:ext cx="8320320" cy="1189080"/>
           </a:xfrm>
           <a:prstGeom prst="rect">
             <a:avLst/>
@@ -8644,7 +8716,7 @@
         <p:spPr>
           <a:xfrm>
             <a:off x="457200" y="1371600"/>
-            <a:ext cx="8228520" cy="456120"/>
+            <a:ext cx="8228160" cy="455760"/>
           </a:xfrm>
           <a:prstGeom prst="rect">
             <a:avLst/>
@@ -8665,7 +8737,7 @@
             <a:normAutofit/>
           </a:bodyPr>
           <a:p>
-            <a:pPr marL="342720" indent="-340200">
+            <a:pPr marL="342720" indent="-339840">
               <a:lnSpc>
                 <a:spcPct val="100000"/>
               </a:lnSpc>
@@ -8731,7 +8803,7 @@
             </a:endParaRPr>
           </a:p>
           <a:p>
-            <a:pPr marL="342720" indent="-340200">
+            <a:pPr marL="342720" indent="-339840">
               <a:lnSpc>
                 <a:spcPct val="100000"/>
               </a:lnSpc>
@@ -8747,7 +8819,7 @@
             </a:endParaRPr>
           </a:p>
           <a:p>
-            <a:pPr marL="342720" indent="-340200">
+            <a:pPr marL="342720" indent="-339840">
               <a:lnSpc>
                 <a:spcPct val="100000"/>
               </a:lnSpc>
@@ -8773,7 +8845,7 @@
         <p:spPr>
           <a:xfrm>
             <a:off x="639720" y="2560680"/>
-            <a:ext cx="8046000" cy="2802240"/>
+            <a:ext cx="8045640" cy="2801880"/>
           </a:xfrm>
           <a:custGeom>
             <a:avLst/>
@@ -9343,7 +9415,7 @@
         <p:spPr>
           <a:xfrm>
             <a:off x="611280" y="259920"/>
-            <a:ext cx="7863480" cy="807120"/>
+            <a:ext cx="7863120" cy="806760"/>
           </a:xfrm>
           <a:prstGeom prst="rect">
             <a:avLst/>
@@ -9428,7 +9500,7 @@
         <p:spPr>
           <a:xfrm>
             <a:off x="674640" y="1400040"/>
-            <a:ext cx="7863480" cy="4406040"/>
+            <a:ext cx="7863120" cy="4405680"/>
           </a:xfrm>
           <a:prstGeom prst="rect">
             <a:avLst/>
@@ -9449,7 +9521,7 @@
             <a:normAutofit/>
           </a:bodyPr>
           <a:p>
-            <a:pPr marL="342720" indent="-340200" algn="ctr">
+            <a:pPr marL="342720" indent="-339840" algn="ctr">
               <a:lnSpc>
                 <a:spcPct val="100000"/>
               </a:lnSpc>
@@ -9475,7 +9547,7 @@
             </a:endParaRPr>
           </a:p>
           <a:p>
-            <a:pPr marL="342720" indent="-340200">
+            <a:pPr marL="342720" indent="-339840">
               <a:lnSpc>
                 <a:spcPct val="100000"/>
               </a:lnSpc>
@@ -9491,7 +9563,7 @@
             </a:endParaRPr>
           </a:p>
           <a:p>
-            <a:pPr marL="342720" indent="-340200">
+            <a:pPr marL="342720" indent="-339840">
               <a:lnSpc>
                 <a:spcPct val="100000"/>
               </a:lnSpc>
@@ -9507,7 +9579,7 @@
             </a:endParaRPr>
           </a:p>
           <a:p>
-            <a:pPr marL="342720" indent="-340200">
+            <a:pPr marL="342720" indent="-339840">
               <a:lnSpc>
                 <a:spcPct val="100000"/>
               </a:lnSpc>
@@ -9536,7 +9608,7 @@
             </a:endParaRPr>
           </a:p>
           <a:p>
-            <a:pPr marL="342720" indent="-340200">
+            <a:pPr marL="342720" indent="-339840">
               <a:lnSpc>
                 <a:spcPct val="100000"/>
               </a:lnSpc>
@@ -9565,7 +9637,7 @@
             </a:endParaRPr>
           </a:p>
           <a:p>
-            <a:pPr marL="342720" indent="-340200">
+            <a:pPr marL="342720" indent="-339840">
               <a:lnSpc>
                 <a:spcPct val="100000"/>
               </a:lnSpc>
@@ -9634,7 +9706,7 @@
         <p:spPr>
           <a:xfrm>
             <a:off x="610920" y="260280"/>
-            <a:ext cx="7861680" cy="805320"/>
+            <a:ext cx="7861320" cy="804960"/>
           </a:xfrm>
           <a:prstGeom prst="rect">
             <a:avLst/>
@@ -9685,7 +9757,7 @@
         <p:spPr>
           <a:xfrm>
             <a:off x="674280" y="1399680"/>
-            <a:ext cx="7861680" cy="4404240"/>
+            <a:ext cx="7861320" cy="4403880"/>
           </a:xfrm>
           <a:prstGeom prst="rect">
             <a:avLst/>
@@ -9748,7 +9820,7 @@
         <p:spPr>
           <a:xfrm>
             <a:off x="611280" y="259920"/>
-            <a:ext cx="7920360" cy="864000"/>
+            <a:ext cx="7920000" cy="863640"/>
           </a:xfrm>
           <a:prstGeom prst="rect">
             <a:avLst/>
@@ -9857,7 +9929,7 @@
         <p:spPr>
           <a:xfrm>
             <a:off x="674280" y="1392120"/>
-            <a:ext cx="7920720" cy="4917240"/>
+            <a:ext cx="7920360" cy="4916880"/>
           </a:xfrm>
           <a:prstGeom prst="rect">
             <a:avLst/>
@@ -10061,7 +10133,7 @@
             </a:endParaRPr>
           </a:p>
           <a:p>
-            <a:pPr marL="228600" indent="-183240">
+            <a:pPr marL="228600" indent="-182880">
               <a:lnSpc>
                 <a:spcPct val="100000"/>
               </a:lnSpc>
@@ -10087,7 +10159,7 @@
         <p:spPr>
           <a:xfrm>
             <a:off x="822240" y="3292560"/>
-            <a:ext cx="3292200" cy="548280"/>
+            <a:ext cx="3291840" cy="547920"/>
           </a:xfrm>
           <a:custGeom>
             <a:avLst/>
@@ -10196,7 +10268,7 @@
         <p:spPr>
           <a:xfrm>
             <a:off x="639720" y="4206960"/>
-            <a:ext cx="3381840" cy="1735560"/>
+            <a:ext cx="3381480" cy="1735200"/>
           </a:xfrm>
           <a:custGeom>
             <a:avLst/>
@@ -10412,7 +10484,7 @@
         <p:spPr>
           <a:xfrm>
             <a:off x="5578560" y="4094280"/>
-            <a:ext cx="2811960" cy="1757880"/>
+            <a:ext cx="2811600" cy="1757520"/>
           </a:xfrm>
           <a:prstGeom prst="rect">
             <a:avLst/>
@@ -10460,7 +10532,7 @@
         <p:spPr>
           <a:xfrm>
             <a:off x="5486400" y="3200400"/>
-            <a:ext cx="3108600" cy="548280"/>
+            <a:ext cx="3108240" cy="547920"/>
           </a:xfrm>
           <a:custGeom>
             <a:avLst/>
@@ -10606,7 +10678,7 @@
         <p:spPr>
           <a:xfrm>
             <a:off x="364680" y="259920"/>
-            <a:ext cx="8411040" cy="864000"/>
+            <a:ext cx="8410680" cy="863640"/>
           </a:xfrm>
           <a:prstGeom prst="rect">
             <a:avLst/>
@@ -10694,7 +10766,7 @@
         <p:spPr>
           <a:xfrm>
             <a:off x="674280" y="1392120"/>
-            <a:ext cx="8285760" cy="5282280"/>
+            <a:ext cx="8285400" cy="5281920"/>
           </a:xfrm>
           <a:prstGeom prst="rect">
             <a:avLst/>
@@ -11112,7 +11184,7 @@
             </a:endParaRPr>
           </a:p>
           <a:p>
-            <a:pPr marL="228600" indent="-227520">
+            <a:pPr marL="228600" indent="-227160">
               <a:lnSpc>
                 <a:spcPct val="100000"/>
               </a:lnSpc>
@@ -11179,7 +11251,7 @@
             </a:endParaRPr>
           </a:p>
           <a:p>
-            <a:pPr marL="228600" indent="-227520">
+            <a:pPr marL="228600" indent="-227160">
               <a:lnSpc>
                 <a:spcPct val="100000"/>
               </a:lnSpc>
@@ -11344,7 +11416,7 @@
         <p:spPr>
           <a:xfrm>
             <a:off x="364680" y="259920"/>
-            <a:ext cx="8411040" cy="864000"/>
+            <a:ext cx="8410680" cy="863640"/>
           </a:xfrm>
           <a:prstGeom prst="rect">
             <a:avLst/>
@@ -11432,7 +11504,7 @@
         <p:spPr>
           <a:xfrm>
             <a:off x="674280" y="1392120"/>
-            <a:ext cx="8285760" cy="5282280"/>
+            <a:ext cx="8285400" cy="5281920"/>
           </a:xfrm>
           <a:prstGeom prst="rect">
             <a:avLst/>
@@ -12101,7 +12173,7 @@
         <p:spPr>
           <a:xfrm>
             <a:off x="611280" y="259920"/>
-            <a:ext cx="7920360" cy="864000"/>
+            <a:ext cx="7920000" cy="863640"/>
           </a:xfrm>
           <a:prstGeom prst="rect">
             <a:avLst/>
@@ -12189,7 +12261,7 @@
         <p:spPr>
           <a:xfrm>
             <a:off x="674280" y="1392120"/>
-            <a:ext cx="7920720" cy="5282280"/>
+            <a:ext cx="7920360" cy="5281920"/>
           </a:xfrm>
           <a:prstGeom prst="rect">
             <a:avLst/>
@@ -12578,7 +12650,7 @@
             </a:endParaRPr>
           </a:p>
           <a:p>
-            <a:pPr marL="228600" indent="-227520">
+            <a:pPr marL="228600" indent="-227160">
               <a:lnSpc>
                 <a:spcPct val="100000"/>
               </a:lnSpc>
@@ -12655,7 +12727,7 @@
             </a:endParaRPr>
           </a:p>
           <a:p>
-            <a:pPr marL="228600" indent="-227520">
+            <a:pPr marL="228600" indent="-227160">
               <a:lnSpc>
                 <a:spcPct val="100000"/>
               </a:lnSpc>
@@ -12722,7 +12794,7 @@
             </a:endParaRPr>
           </a:p>
           <a:p>
-            <a:pPr marL="228600" indent="-227520">
+            <a:pPr marL="228600" indent="-227160">
               <a:lnSpc>
                 <a:spcPct val="100000"/>
               </a:lnSpc>
@@ -12799,7 +12871,7 @@
             </a:endParaRPr>
           </a:p>
           <a:p>
-            <a:pPr marL="228600" indent="-183240">
+            <a:pPr marL="228600" indent="-182880">
               <a:lnSpc>
                 <a:spcPct val="100000"/>
               </a:lnSpc>
@@ -12862,7 +12934,7 @@
         <p:spPr>
           <a:xfrm>
             <a:off x="611280" y="260280"/>
-            <a:ext cx="7882200" cy="826200"/>
+            <a:ext cx="7881840" cy="825840"/>
           </a:xfrm>
           <a:prstGeom prst="rect">
             <a:avLst/>
@@ -12950,7 +13022,7 @@
         <p:spPr>
           <a:xfrm>
             <a:off x="620280" y="1216080"/>
-            <a:ext cx="7882560" cy="5183640"/>
+            <a:ext cx="7882200" cy="5183280"/>
           </a:xfrm>
           <a:prstGeom prst="rect">
             <a:avLst/>
@@ -12971,7 +13043,7 @@
             <a:normAutofit/>
           </a:bodyPr>
           <a:p>
-            <a:pPr marL="342720" indent="-321120">
+            <a:pPr marL="342720" indent="-320760">
               <a:lnSpc>
                 <a:spcPct val="100000"/>
               </a:lnSpc>
@@ -13048,7 +13120,7 @@
             </a:endParaRPr>
           </a:p>
           <a:p>
-            <a:pPr lvl="1" marL="1484280" indent="-567360">
+            <a:pPr lvl="1" marL="1484280" indent="-567000">
               <a:lnSpc>
                 <a:spcPct val="100000"/>
               </a:lnSpc>
@@ -13114,7 +13186,7 @@
             </a:endParaRPr>
           </a:p>
           <a:p>
-            <a:pPr marL="342720" indent="-321120">
+            <a:pPr marL="342720" indent="-320760">
               <a:lnSpc>
                 <a:spcPct val="100000"/>
               </a:lnSpc>
@@ -13130,7 +13202,7 @@
             </a:endParaRPr>
           </a:p>
           <a:p>
-            <a:pPr marL="342720" indent="-321120">
+            <a:pPr marL="342720" indent="-320760">
               <a:lnSpc>
                 <a:spcPct val="100000"/>
               </a:lnSpc>
@@ -13207,7 +13279,7 @@
             </a:endParaRPr>
           </a:p>
           <a:p>
-            <a:pPr lvl="1" marL="1484280" indent="-567360">
+            <a:pPr lvl="1" marL="1484280" indent="-567000">
               <a:lnSpc>
                 <a:spcPct val="100000"/>
               </a:lnSpc>
@@ -13273,7 +13345,7 @@
             </a:endParaRPr>
           </a:p>
           <a:p>
-            <a:pPr marL="742680" indent="-263880">
+            <a:pPr marL="742680" indent="-263520">
               <a:lnSpc>
                 <a:spcPct val="100000"/>
               </a:lnSpc>
@@ -13289,7 +13361,7 @@
             </a:endParaRPr>
           </a:p>
           <a:p>
-            <a:pPr marL="342720" indent="-322920">
+            <a:pPr marL="342720" indent="-322560">
               <a:lnSpc>
                 <a:spcPct val="100000"/>
               </a:lnSpc>
@@ -13328,7 +13400,38 @@
                 <a:latin typeface="Arial"/>
                 <a:ea typeface="DejaVu Sans"/>
               </a:rPr>
-              <a:t> using HTTP response codes and Location header.</a:t>
+              <a:t> </a:t>
+            </a:r>
+            <a:endParaRPr b="0" lang="en-US" sz="2400" spc="-1" strike="noStrike">
+              <a:latin typeface="Arial"/>
+            </a:endParaRPr>
+          </a:p>
+          <a:p>
+            <a:pPr lvl="1" marL="342720" indent="-322560">
+              <a:lnSpc>
+                <a:spcPct val="100000"/>
+              </a:lnSpc>
+              <a:spcBef>
+                <a:spcPts val="598"/>
+              </a:spcBef>
+              <a:buClr>
+                <a:srgbClr val="000000"/>
+              </a:buClr>
+              <a:buFont typeface="Times New Roman"/>
+              <a:buChar char="–"/>
+              <a:tabLst>
+                <a:tab algn="l" pos="0"/>
+              </a:tabLst>
+            </a:pPr>
+            <a:r>
+              <a:rPr b="0" lang="en-US" sz="2400" spc="-1" strike="noStrike">
+                <a:solidFill>
+                  <a:srgbClr val="000000"/>
+                </a:solidFill>
+                <a:latin typeface="Arial"/>
+                <a:ea typeface="DejaVu Sans"/>
+              </a:rPr>
+              <a:t>Send the browser to another web site.</a:t>
             </a:r>
             <a:endParaRPr b="0" lang="en-US" sz="2400" spc="-1" strike="noStrike">
               <a:latin typeface="Arial"/>
@@ -13382,7 +13485,7 @@
         <p:spPr>
           <a:xfrm>
             <a:off x="364680" y="259920"/>
-            <a:ext cx="8411040" cy="864000"/>
+            <a:ext cx="8410680" cy="863640"/>
           </a:xfrm>
           <a:prstGeom prst="rect">
             <a:avLst/>
@@ -13470,7 +13573,7 @@
         <p:spPr>
           <a:xfrm>
             <a:off x="674280" y="1392120"/>
-            <a:ext cx="8285760" cy="5282280"/>
+            <a:ext cx="8285400" cy="5281920"/>
           </a:xfrm>
           <a:prstGeom prst="rect">
             <a:avLst/>
@@ -14187,7 +14290,7 @@
         <p:spPr>
           <a:xfrm>
             <a:off x="611280" y="260280"/>
-            <a:ext cx="7882200" cy="826200"/>
+            <a:ext cx="7881840" cy="825840"/>
           </a:xfrm>
           <a:prstGeom prst="rect">
             <a:avLst/>
@@ -14275,7 +14378,7 @@
         <p:spPr>
           <a:xfrm>
             <a:off x="674640" y="1255680"/>
-            <a:ext cx="8103240" cy="5236200"/>
+            <a:ext cx="8102880" cy="5235840"/>
           </a:xfrm>
           <a:prstGeom prst="rect">
             <a:avLst/>
@@ -14296,7 +14399,7 @@
             <a:normAutofit/>
           </a:bodyPr>
           <a:p>
-            <a:pPr marL="342720" indent="-321120" algn="ctr">
+            <a:pPr marL="342720" indent="-320760" algn="ctr">
               <a:lnSpc>
                 <a:spcPct val="100000"/>
               </a:lnSpc>
@@ -14322,7 +14425,7 @@
             </a:endParaRPr>
           </a:p>
           <a:p>
-            <a:pPr marL="342720" indent="-321120" algn="ctr">
+            <a:pPr marL="342720" indent="-320760" algn="ctr">
               <a:lnSpc>
                 <a:spcPct val="100000"/>
               </a:lnSpc>
@@ -14348,7 +14451,7 @@
             </a:endParaRPr>
           </a:p>
           <a:p>
-            <a:pPr marL="342720" indent="-321120">
+            <a:pPr marL="342720" indent="-320760">
               <a:lnSpc>
                 <a:spcPct val="100000"/>
               </a:lnSpc>
@@ -14364,7 +14467,7 @@
             </a:endParaRPr>
           </a:p>
           <a:p>
-            <a:pPr marL="342720" indent="-321120">
+            <a:pPr marL="342720" indent="-320760">
               <a:lnSpc>
                 <a:spcPct val="100000"/>
               </a:lnSpc>
@@ -14400,7 +14503,7 @@
             </a:endParaRPr>
           </a:p>
           <a:p>
-            <a:pPr marL="342720" indent="-321120">
+            <a:pPr marL="342720" indent="-320760">
               <a:lnSpc>
                 <a:spcPct val="100000"/>
               </a:lnSpc>
@@ -14416,7 +14519,7 @@
             </a:endParaRPr>
           </a:p>
           <a:p>
-            <a:pPr marL="342720" indent="-321120">
+            <a:pPr marL="342720" indent="-320760">
               <a:lnSpc>
                 <a:spcPct val="100000"/>
               </a:lnSpc>
@@ -14482,7 +14585,7 @@
             </a:endParaRPr>
           </a:p>
           <a:p>
-            <a:pPr marL="342720" indent="-321120">
+            <a:pPr marL="342720" indent="-320760">
               <a:lnSpc>
                 <a:spcPct val="100000"/>
               </a:lnSpc>
@@ -14508,7 +14611,7 @@
             </a:endParaRPr>
           </a:p>
           <a:p>
-            <a:pPr marL="342720" indent="-321120">
+            <a:pPr marL="342720" indent="-320760">
               <a:lnSpc>
                 <a:spcPct val="100000"/>
               </a:lnSpc>
@@ -14534,7 +14637,7 @@
             </a:endParaRPr>
           </a:p>
           <a:p>
-            <a:pPr marL="342720" indent="-321120">
+            <a:pPr marL="342720" indent="-320760">
               <a:lnSpc>
                 <a:spcPct val="100000"/>
               </a:lnSpc>
@@ -14550,7 +14653,7 @@
             </a:endParaRPr>
           </a:p>
           <a:p>
-            <a:pPr marL="342720" indent="-321120">
+            <a:pPr marL="342720" indent="-320760">
               <a:lnSpc>
                 <a:spcPct val="100000"/>
               </a:lnSpc>
@@ -14576,7 +14679,7 @@
             </a:endParaRPr>
           </a:p>
           <a:p>
-            <a:pPr marL="342720" indent="-321120">
+            <a:pPr marL="342720" indent="-320760">
               <a:lnSpc>
                 <a:spcPct val="100000"/>
               </a:lnSpc>
@@ -14602,7 +14705,7 @@
             </a:endParaRPr>
           </a:p>
           <a:p>
-            <a:pPr marL="342720" indent="-321120">
+            <a:pPr marL="342720" indent="-320760">
               <a:lnSpc>
                 <a:spcPct val="100000"/>
               </a:lnSpc>
@@ -14618,7 +14721,7 @@
             </a:endParaRPr>
           </a:p>
           <a:p>
-            <a:pPr marL="342720" indent="-321120">
+            <a:pPr marL="342720" indent="-320760">
               <a:lnSpc>
                 <a:spcPct val="100000"/>
               </a:lnSpc>
@@ -14681,7 +14784,7 @@
         <p:spPr>
           <a:xfrm>
             <a:off x="611280" y="259920"/>
-            <a:ext cx="7864920" cy="808560"/>
+            <a:ext cx="7864560" cy="808200"/>
           </a:xfrm>
           <a:prstGeom prst="rect">
             <a:avLst/>
@@ -14787,7 +14890,7 @@
         <p:spPr>
           <a:xfrm>
             <a:off x="674640" y="1400040"/>
-            <a:ext cx="7864920" cy="702360"/>
+            <a:ext cx="7864560" cy="702000"/>
           </a:xfrm>
           <a:prstGeom prst="rect">
             <a:avLst/>
@@ -14808,7 +14911,7 @@
             <a:normAutofit/>
           </a:bodyPr>
           <a:p>
-            <a:pPr marL="342720" indent="-338760">
+            <a:pPr marL="342720" indent="-338400">
               <a:lnSpc>
                 <a:spcPct val="100000"/>
               </a:lnSpc>
@@ -14848,7 +14951,7 @@
         <p:spPr>
           <a:xfrm>
             <a:off x="1096920" y="3017880"/>
-            <a:ext cx="1454760" cy="1348200"/>
+            <a:ext cx="1454400" cy="1347840"/>
           </a:xfrm>
           <a:prstGeom prst="rect">
             <a:avLst/>
@@ -14867,7 +14970,7 @@
         <p:spPr>
           <a:xfrm>
             <a:off x="914400" y="2028960"/>
-            <a:ext cx="2651400" cy="456120"/>
+            <a:ext cx="2651040" cy="455760"/>
           </a:xfrm>
           <a:custGeom>
             <a:avLst/>
@@ -14976,7 +15079,7 @@
         <p:spPr>
           <a:xfrm>
             <a:off x="5668920" y="2011320"/>
-            <a:ext cx="3017520" cy="548280"/>
+            <a:ext cx="3017160" cy="547920"/>
           </a:xfrm>
           <a:custGeom>
             <a:avLst/>
@@ -15085,7 +15188,7 @@
         <p:spPr>
           <a:xfrm>
             <a:off x="5394240" y="3033720"/>
-            <a:ext cx="3291480" cy="1735560"/>
+            <a:ext cx="3291120" cy="1735200"/>
           </a:xfrm>
           <a:custGeom>
             <a:avLst/>
@@ -15381,7 +15484,7 @@
         <p:spPr>
           <a:xfrm>
             <a:off x="2598840" y="2805120"/>
-            <a:ext cx="2703960" cy="638640"/>
+            <a:ext cx="2703600" cy="638280"/>
           </a:xfrm>
           <a:custGeom>
             <a:avLst/>
@@ -15519,7 +15622,7 @@
         <p:spPr>
           <a:xfrm>
             <a:off x="2651040" y="3519360"/>
-            <a:ext cx="2703960" cy="638640"/>
+            <a:ext cx="2703600" cy="638280"/>
           </a:xfrm>
           <a:custGeom>
             <a:avLst/>
@@ -15632,7 +15735,7 @@
         <p:spPr>
           <a:xfrm>
             <a:off x="4700520" y="5291280"/>
-            <a:ext cx="2613600" cy="1473480"/>
+            <a:ext cx="2613240" cy="1473120"/>
           </a:xfrm>
           <a:prstGeom prst="rect">
             <a:avLst/>
@@ -15680,7 +15783,7 @@
         <p:spPr>
           <a:xfrm>
             <a:off x="3108240" y="4572000"/>
-            <a:ext cx="1697760" cy="638640"/>
+            <a:ext cx="1697400" cy="638280"/>
           </a:xfrm>
           <a:custGeom>
             <a:avLst/>
@@ -15826,7 +15929,7 @@
         <p:spPr>
           <a:xfrm>
             <a:off x="611280" y="259920"/>
-            <a:ext cx="7920360" cy="864000"/>
+            <a:ext cx="7920000" cy="863640"/>
           </a:xfrm>
           <a:prstGeom prst="rect">
             <a:avLst/>
@@ -15914,7 +16017,7 @@
         <p:spPr>
           <a:xfrm>
             <a:off x="582120" y="1371240"/>
-            <a:ext cx="8377920" cy="4937760"/>
+            <a:ext cx="8377560" cy="4937400"/>
           </a:xfrm>
           <a:prstGeom prst="rect">
             <a:avLst/>
@@ -16413,7 +16516,7 @@
             </a:endParaRPr>
           </a:p>
           <a:p>
-            <a:pPr marL="228600" indent="-183240">
+            <a:pPr marL="228600" indent="-182880">
               <a:lnSpc>
                 <a:spcPct val="100000"/>
               </a:lnSpc>
@@ -16476,7 +16579,7 @@
         <p:spPr>
           <a:xfrm>
             <a:off x="611280" y="259920"/>
-            <a:ext cx="7920360" cy="864000"/>
+            <a:ext cx="7920000" cy="863640"/>
           </a:xfrm>
           <a:prstGeom prst="rect">
             <a:avLst/>
@@ -16564,7 +16667,7 @@
         <p:spPr>
           <a:xfrm>
             <a:off x="545760" y="1371240"/>
-            <a:ext cx="8195040" cy="4753440"/>
+            <a:ext cx="8194680" cy="4753080"/>
           </a:xfrm>
           <a:prstGeom prst="rect">
             <a:avLst/>
@@ -17500,7 +17603,7 @@
             </a:endParaRPr>
           </a:p>
           <a:p>
-            <a:pPr marL="228600" indent="-183240">
+            <a:pPr marL="228600" indent="-182880">
               <a:lnSpc>
                 <a:spcPct val="100000"/>
               </a:lnSpc>
@@ -17526,7 +17629,7 @@
         <p:spPr>
           <a:xfrm>
             <a:off x="914400" y="5246640"/>
-            <a:ext cx="7771320" cy="1186560"/>
+            <a:ext cx="7770960" cy="1186200"/>
           </a:xfrm>
           <a:custGeom>
             <a:avLst/>
@@ -17705,7 +17808,7 @@
         <p:spPr>
           <a:xfrm>
             <a:off x="611280" y="259920"/>
-            <a:ext cx="7920360" cy="864000"/>
+            <a:ext cx="7920000" cy="863640"/>
           </a:xfrm>
           <a:prstGeom prst="rect">
             <a:avLst/>
@@ -17793,7 +17896,7 @@
         <p:spPr>
           <a:xfrm>
             <a:off x="528120" y="1226880"/>
-            <a:ext cx="8046000" cy="5302800"/>
+            <a:ext cx="8045640" cy="5302440"/>
           </a:xfrm>
           <a:prstGeom prst="rect">
             <a:avLst/>
@@ -18446,7 +18549,7 @@
         <p:spPr>
           <a:xfrm>
             <a:off x="611280" y="260280"/>
-            <a:ext cx="7882200" cy="826200"/>
+            <a:ext cx="7881840" cy="825840"/>
           </a:xfrm>
           <a:prstGeom prst="rect">
             <a:avLst/>
@@ -18534,7 +18637,7 @@
         <p:spPr>
           <a:xfrm>
             <a:off x="674280" y="1399680"/>
-            <a:ext cx="7882560" cy="4425120"/>
+            <a:ext cx="7882200" cy="4424760"/>
           </a:xfrm>
           <a:prstGeom prst="rect">
             <a:avLst/>
@@ -18555,7 +18658,7 @@
             <a:normAutofit/>
           </a:bodyPr>
           <a:p>
-            <a:pPr marL="342720" indent="-321120">
+            <a:pPr marL="342720" indent="-320760">
               <a:lnSpc>
                 <a:spcPct val="100000"/>
               </a:lnSpc>
@@ -18581,7 +18684,7 @@
             </a:endParaRPr>
           </a:p>
           <a:p>
-            <a:pPr marL="342720" indent="-321120">
+            <a:pPr marL="342720" indent="-320760">
               <a:lnSpc>
                 <a:spcPct val="100000"/>
               </a:lnSpc>
@@ -18607,7 +18710,7 @@
             </a:endParaRPr>
           </a:p>
           <a:p>
-            <a:pPr marL="342720" indent="-321120">
+            <a:pPr marL="342720" indent="-320760">
               <a:lnSpc>
                 <a:spcPct val="100000"/>
               </a:lnSpc>
@@ -18633,7 +18736,7 @@
             </a:endParaRPr>
           </a:p>
           <a:p>
-            <a:pPr marL="342720" indent="-321120">
+            <a:pPr marL="342720" indent="-320760">
               <a:lnSpc>
                 <a:spcPct val="100000"/>
               </a:lnSpc>
@@ -18659,7 +18762,7 @@
             </a:endParaRPr>
           </a:p>
           <a:p>
-            <a:pPr lvl="1" marL="1155600" indent="-483120">
+            <a:pPr lvl="1" marL="1155600" indent="-482760">
               <a:lnSpc>
                 <a:spcPct val="100000"/>
               </a:lnSpc>
@@ -18773,7 +18876,7 @@
         <p:spPr>
           <a:xfrm>
             <a:off x="611280" y="439560"/>
-            <a:ext cx="7920360" cy="864360"/>
+            <a:ext cx="7920000" cy="864000"/>
           </a:xfrm>
           <a:prstGeom prst="rect">
             <a:avLst/>
@@ -18861,7 +18964,7 @@
         <p:spPr>
           <a:xfrm>
             <a:off x="582120" y="1371240"/>
-            <a:ext cx="7920720" cy="5302800"/>
+            <a:ext cx="7920360" cy="5302440"/>
           </a:xfrm>
           <a:prstGeom prst="rect">
             <a:avLst/>
@@ -19420,7 +19523,7 @@
             </a:endParaRPr>
           </a:p>
           <a:p>
-            <a:pPr marL="228600" indent="-183240">
+            <a:pPr marL="228600" indent="-182880">
               <a:lnSpc>
                 <a:spcPct val="100000"/>
               </a:lnSpc>
@@ -19483,7 +19586,7 @@
         <p:spPr>
           <a:xfrm>
             <a:off x="611280" y="260280"/>
-            <a:ext cx="7890120" cy="834120"/>
+            <a:ext cx="7889760" cy="833760"/>
           </a:xfrm>
           <a:prstGeom prst="rect">
             <a:avLst/>
@@ -19571,7 +19674,7 @@
         <p:spPr>
           <a:xfrm>
             <a:off x="674280" y="1399680"/>
-            <a:ext cx="7890480" cy="1707120"/>
+            <a:ext cx="7890120" cy="1706760"/>
           </a:xfrm>
           <a:prstGeom prst="rect">
             <a:avLst/>
@@ -19673,7 +19776,7 @@
             </a:endParaRPr>
           </a:p>
           <a:p>
-            <a:pPr marL="342720" indent="-313200">
+            <a:pPr marL="342720" indent="-312840">
               <a:lnSpc>
                 <a:spcPct val="100000"/>
               </a:lnSpc>
@@ -19749,7 +19852,7 @@
         <p:spPr>
           <a:xfrm>
             <a:off x="822240" y="3017880"/>
-            <a:ext cx="7588800" cy="3199320"/>
+            <a:ext cx="7588440" cy="3198960"/>
           </a:xfrm>
           <a:custGeom>
             <a:avLst/>
@@ -19798,7 +19901,7 @@
             <a:noAutofit/>
           </a:bodyPr>
           <a:p>
-            <a:pPr marL="342720" indent="-313200">
+            <a:pPr marL="342720" indent="-312840">
               <a:lnSpc>
                 <a:spcPct val="100000"/>
               </a:lnSpc>
@@ -19824,7 +19927,7 @@
             </a:endParaRPr>
           </a:p>
           <a:p>
-            <a:pPr marL="342720" indent="-313200">
+            <a:pPr marL="342720" indent="-312840">
               <a:lnSpc>
                 <a:spcPct val="100000"/>
               </a:lnSpc>
@@ -19850,7 +19953,7 @@
             </a:endParaRPr>
           </a:p>
           <a:p>
-            <a:pPr marL="342720" indent="-313200">
+            <a:pPr marL="342720" indent="-312840">
               <a:lnSpc>
                 <a:spcPct val="100000"/>
               </a:lnSpc>
@@ -19876,7 +19979,7 @@
             </a:endParaRPr>
           </a:p>
           <a:p>
-            <a:pPr marL="342720" indent="-313200">
+            <a:pPr marL="342720" indent="-312840">
               <a:lnSpc>
                 <a:spcPct val="100000"/>
               </a:lnSpc>
@@ -19912,7 +20015,7 @@
             </a:endParaRPr>
           </a:p>
           <a:p>
-            <a:pPr marL="342720" indent="-313200">
+            <a:pPr marL="342720" indent="-312840">
               <a:lnSpc>
                 <a:spcPct val="100000"/>
               </a:lnSpc>
@@ -19938,7 +20041,7 @@
             </a:endParaRPr>
           </a:p>
           <a:p>
-            <a:pPr marL="342720" indent="-313200">
+            <a:pPr marL="342720" indent="-312840">
               <a:lnSpc>
                 <a:spcPct val="100000"/>
               </a:lnSpc>
@@ -19964,7 +20067,7 @@
             </a:endParaRPr>
           </a:p>
           <a:p>
-            <a:pPr marL="342720" indent="-313200">
+            <a:pPr marL="342720" indent="-312840">
               <a:lnSpc>
                 <a:spcPct val="100000"/>
               </a:lnSpc>
@@ -19990,7 +20093,7 @@
             </a:endParaRPr>
           </a:p>
           <a:p>
-            <a:pPr marL="342720" indent="-313200">
+            <a:pPr marL="342720" indent="-312840">
               <a:lnSpc>
                 <a:spcPct val="100000"/>
               </a:lnSpc>
@@ -20016,7 +20119,7 @@
             </a:endParaRPr>
           </a:p>
           <a:p>
-            <a:pPr marL="342720" indent="-313200">
+            <a:pPr marL="342720" indent="-312840">
               <a:lnSpc>
                 <a:spcPct val="100000"/>
               </a:lnSpc>
@@ -20086,7 +20189,7 @@
         <p:spPr>
           <a:xfrm>
             <a:off x="611280" y="260280"/>
-            <a:ext cx="7890120" cy="834120"/>
+            <a:ext cx="7889760" cy="833760"/>
           </a:xfrm>
           <a:prstGeom prst="rect">
             <a:avLst/>
@@ -20174,7 +20277,7 @@
         <p:spPr>
           <a:xfrm>
             <a:off x="674280" y="1399680"/>
-            <a:ext cx="8193600" cy="612000"/>
+            <a:ext cx="8193240" cy="611640"/>
           </a:xfrm>
           <a:prstGeom prst="rect">
             <a:avLst/>
@@ -20195,7 +20298,7 @@
             <a:normAutofit/>
           </a:bodyPr>
           <a:p>
-            <a:pPr marL="342720" indent="-313200">
+            <a:pPr marL="342720" indent="-312840">
               <a:lnSpc>
                 <a:spcPct val="100000"/>
               </a:lnSpc>
@@ -20241,7 +20344,7 @@
         <p:spPr>
           <a:xfrm>
             <a:off x="639720" y="1998720"/>
-            <a:ext cx="8028360" cy="4218120"/>
+            <a:ext cx="8028000" cy="4218120"/>
           </a:xfrm>
           <a:custGeom>
             <a:avLst/>
@@ -20288,7 +20391,7 @@
             <a:spAutoFit/>
           </a:bodyPr>
           <a:p>
-            <a:pPr marL="223560" indent="-162360">
+            <a:pPr marL="223560" indent="-162000">
               <a:lnSpc>
                 <a:spcPct val="100000"/>
               </a:lnSpc>
@@ -20314,7 +20417,7 @@
             </a:endParaRPr>
           </a:p>
           <a:p>
-            <a:pPr marL="223560" indent="-162360">
+            <a:pPr marL="223560" indent="-162000">
               <a:lnSpc>
                 <a:spcPct val="100000"/>
               </a:lnSpc>
@@ -20360,7 +20463,7 @@
             </a:endParaRPr>
           </a:p>
           <a:p>
-            <a:pPr marL="223560" indent="-162360">
+            <a:pPr marL="223560" indent="-162000">
               <a:lnSpc>
                 <a:spcPct val="100000"/>
               </a:lnSpc>
@@ -20386,7 +20489,7 @@
             </a:endParaRPr>
           </a:p>
           <a:p>
-            <a:pPr marL="223560" indent="-162360">
+            <a:pPr marL="223560" indent="-162000">
               <a:lnSpc>
                 <a:spcPct val="100000"/>
               </a:lnSpc>
@@ -20432,7 +20535,7 @@
             </a:endParaRPr>
           </a:p>
           <a:p>
-            <a:pPr marL="223560" indent="-162360">
+            <a:pPr marL="223560" indent="-162000">
               <a:lnSpc>
                 <a:spcPct val="100000"/>
               </a:lnSpc>
@@ -20458,7 +20561,7 @@
             </a:endParaRPr>
           </a:p>
           <a:p>
-            <a:pPr marL="223560" indent="-162360">
+            <a:pPr marL="223560" indent="-162000">
               <a:lnSpc>
                 <a:spcPct val="100000"/>
               </a:lnSpc>
@@ -20484,7 +20587,7 @@
             </a:endParaRPr>
           </a:p>
           <a:p>
-            <a:pPr marL="223560" indent="-162360">
+            <a:pPr marL="223560" indent="-162000">
               <a:lnSpc>
                 <a:spcPct val="100000"/>
               </a:lnSpc>
@@ -20510,7 +20613,7 @@
             </a:endParaRPr>
           </a:p>
           <a:p>
-            <a:pPr marL="223560" indent="-162360">
+            <a:pPr marL="223560" indent="-162000">
               <a:lnSpc>
                 <a:spcPct val="100000"/>
               </a:lnSpc>
@@ -20556,7 +20659,7 @@
             </a:endParaRPr>
           </a:p>
           <a:p>
-            <a:pPr marL="223560" indent="-162360">
+            <a:pPr marL="223560" indent="-162000">
               <a:lnSpc>
                 <a:spcPct val="100000"/>
               </a:lnSpc>
@@ -20582,7 +20685,7 @@
             </a:endParaRPr>
           </a:p>
           <a:p>
-            <a:pPr marL="223560" indent="-162360">
+            <a:pPr marL="223560" indent="-162000">
               <a:lnSpc>
                 <a:spcPct val="100000"/>
               </a:lnSpc>
@@ -20608,7 +20711,7 @@
             </a:endParaRPr>
           </a:p>
           <a:p>
-            <a:pPr marL="223560" indent="-162360">
+            <a:pPr marL="223560" indent="-162000">
               <a:lnSpc>
                 <a:spcPct val="100000"/>
               </a:lnSpc>
@@ -20701,7 +20804,7 @@
         <p:spPr>
           <a:xfrm>
             <a:off x="611280" y="259920"/>
-            <a:ext cx="7920360" cy="864000"/>
+            <a:ext cx="7920000" cy="863640"/>
           </a:xfrm>
           <a:prstGeom prst="rect">
             <a:avLst/>
@@ -20789,7 +20892,7 @@
         <p:spPr>
           <a:xfrm>
             <a:off x="674280" y="1391760"/>
-            <a:ext cx="7920720" cy="5374440"/>
+            <a:ext cx="7920360" cy="5374080"/>
           </a:xfrm>
           <a:prstGeom prst="rect">
             <a:avLst/>
@@ -20891,7 +20994,7 @@
             </a:endParaRPr>
           </a:p>
           <a:p>
-            <a:pPr lvl="1" marL="1535040" indent="-584640">
+            <a:pPr lvl="1" marL="1535040" indent="-584280">
               <a:lnSpc>
                 <a:spcPct val="100000"/>
               </a:lnSpc>
@@ -20957,7 +21060,7 @@
             </a:endParaRPr>
           </a:p>
           <a:p>
-            <a:pPr lvl="1" marL="1535040" indent="-584640">
+            <a:pPr lvl="1" marL="1535040" indent="-584280">
               <a:lnSpc>
                 <a:spcPct val="100000"/>
               </a:lnSpc>
@@ -21023,7 +21126,7 @@
             </a:endParaRPr>
           </a:p>
           <a:p>
-            <a:pPr marL="228600" indent="-227520">
+            <a:pPr marL="228600" indent="-227160">
               <a:lnSpc>
                 <a:spcPct val="100000"/>
               </a:lnSpc>
@@ -21123,14 +21226,14 @@
                 <a:latin typeface="Arial"/>
                 <a:ea typeface="Arial"/>
               </a:rPr>
-              <a:t>) - older tool, part of Linux and Mac OSX.</a:t>
+              <a:t>) - older tool, part of Linux and Mac OSx.</a:t>
             </a:r>
             <a:endParaRPr b="0" lang="en-US" sz="2400" spc="-1" strike="noStrike">
               <a:latin typeface="Arial"/>
             </a:endParaRPr>
           </a:p>
           <a:p>
-            <a:pPr marL="228600" indent="-227520">
+            <a:pPr marL="228600" indent="-227160">
               <a:lnSpc>
                 <a:spcPct val="100000"/>
               </a:lnSpc>
@@ -21217,7 +21320,7 @@
             </a:endParaRPr>
           </a:p>
           <a:p>
-            <a:pPr marL="228600" indent="-227520">
+            <a:pPr marL="228600" indent="-227160">
               <a:lnSpc>
                 <a:spcPct val="100000"/>
               </a:lnSpc>
@@ -21294,7 +21397,7 @@
             </a:endParaRPr>
           </a:p>
           <a:p>
-            <a:pPr marL="228600" indent="-227520">
+            <a:pPr marL="228600" indent="-227160">
               <a:lnSpc>
                 <a:spcPct val="100000"/>
               </a:lnSpc>
@@ -21419,7 +21522,7 @@
         <p:spPr>
           <a:xfrm>
             <a:off x="611280" y="260280"/>
-            <a:ext cx="7890120" cy="834120"/>
+            <a:ext cx="7889760" cy="833760"/>
           </a:xfrm>
           <a:prstGeom prst="rect">
             <a:avLst/>
@@ -21507,7 +21610,7 @@
         <p:spPr>
           <a:xfrm>
             <a:off x="674280" y="1399680"/>
-            <a:ext cx="7890480" cy="4999680"/>
+            <a:ext cx="7890120" cy="4999320"/>
           </a:xfrm>
           <a:prstGeom prst="rect">
             <a:avLst/>
@@ -21528,7 +21631,7 @@
             <a:normAutofit/>
           </a:bodyPr>
           <a:p>
-            <a:pPr marL="342720" indent="-313200">
+            <a:pPr marL="342720" indent="-312840">
               <a:lnSpc>
                 <a:spcPct val="100000"/>
               </a:lnSpc>
@@ -21554,7 +21657,7 @@
             </a:endParaRPr>
           </a:p>
           <a:p>
-            <a:pPr marL="342720" indent="-313200">
+            <a:pPr marL="342720" indent="-312840">
               <a:lnSpc>
                 <a:spcPct val="100000"/>
               </a:lnSpc>
@@ -21580,7 +21683,7 @@
             </a:endParaRPr>
           </a:p>
           <a:p>
-            <a:pPr marL="342720" indent="-313200">
+            <a:pPr marL="342720" indent="-312840">
               <a:lnSpc>
                 <a:spcPct val="100000"/>
               </a:lnSpc>
@@ -21616,7 +21719,7 @@
             </a:endParaRPr>
           </a:p>
           <a:p>
-            <a:pPr marL="342720" indent="-313200">
+            <a:pPr marL="342720" indent="-312840">
               <a:lnSpc>
                 <a:spcPct val="100000"/>
               </a:lnSpc>
@@ -21662,7 +21765,7 @@
             </a:endParaRPr>
           </a:p>
           <a:p>
-            <a:pPr marL="342720" indent="-313200">
+            <a:pPr marL="342720" indent="-312840">
               <a:lnSpc>
                 <a:spcPct val="100000"/>
               </a:lnSpc>
@@ -21688,7 +21791,7 @@
             </a:endParaRPr>
           </a:p>
           <a:p>
-            <a:pPr marL="342720" indent="-313200">
+            <a:pPr marL="342720" indent="-312840">
               <a:lnSpc>
                 <a:spcPct val="100000"/>
               </a:lnSpc>
@@ -21704,7 +21807,7 @@
             </a:endParaRPr>
           </a:p>
           <a:p>
-            <a:pPr marL="342720" indent="-313200">
+            <a:pPr marL="342720" indent="-312840">
               <a:lnSpc>
                 <a:spcPct val="100000"/>
               </a:lnSpc>
@@ -21730,7 +21833,7 @@
             </a:endParaRPr>
           </a:p>
           <a:p>
-            <a:pPr marL="342720" indent="-313200">
+            <a:pPr marL="342720" indent="-312840">
               <a:lnSpc>
                 <a:spcPct val="100000"/>
               </a:lnSpc>
@@ -21746,7 +21849,7 @@
             </a:endParaRPr>
           </a:p>
           <a:p>
-            <a:pPr marL="342720" indent="-313200">
+            <a:pPr marL="342720" indent="-312840">
               <a:lnSpc>
                 <a:spcPct val="100000"/>
               </a:lnSpc>
@@ -21772,7 +21875,7 @@
             </a:endParaRPr>
           </a:p>
           <a:p>
-            <a:pPr marL="342720" indent="-313200">
+            <a:pPr marL="342720" indent="-312840">
               <a:lnSpc>
                 <a:spcPct val="100000"/>
               </a:lnSpc>
@@ -21798,7 +21901,7 @@
             </a:endParaRPr>
           </a:p>
           <a:p>
-            <a:pPr marL="342720" indent="-313200">
+            <a:pPr marL="342720" indent="-312840">
               <a:lnSpc>
                 <a:spcPct val="100000"/>
               </a:lnSpc>
@@ -21861,7 +21964,7 @@
         <p:spPr>
           <a:xfrm>
             <a:off x="182160" y="77400"/>
-            <a:ext cx="8868240" cy="1189440"/>
+            <a:ext cx="8867880" cy="1189080"/>
           </a:xfrm>
           <a:prstGeom prst="rect">
             <a:avLst/>
@@ -21949,7 +22052,7 @@
         <p:spPr>
           <a:xfrm>
             <a:off x="889920" y="6433200"/>
-            <a:ext cx="7406280" cy="363960"/>
+            <a:ext cx="7405920" cy="363600"/>
           </a:xfrm>
           <a:custGeom>
             <a:avLst/>
@@ -22096,7 +22199,7 @@
         <p:spPr>
           <a:xfrm>
             <a:off x="448920" y="1130040"/>
-            <a:ext cx="8237880" cy="5291280"/>
+            <a:ext cx="8237520" cy="5290920"/>
           </a:xfrm>
           <a:prstGeom prst="rect">
             <a:avLst/>
@@ -22115,13 +22218,13 @@
         <p:spPr>
           <a:xfrm>
             <a:off x="7223760" y="6126480"/>
-            <a:ext cx="731520" cy="306720"/>
+            <a:ext cx="731160" cy="306360"/>
           </a:xfrm>
           <a:custGeom>
             <a:avLst/>
             <a:gdLst/>
             <a:ahLst/>
-            <a:rect l="0" t="0" r="r" b="b"/>
+            <a:rect l="l" t="t" r="r" b="b"/>
             <a:pathLst>
               <a:path w="2034" h="854">
                 <a:moveTo>
@@ -22213,7 +22316,7 @@
         <p:spPr>
           <a:xfrm>
             <a:off x="611280" y="260280"/>
-            <a:ext cx="7866360" cy="810360"/>
+            <a:ext cx="7866000" cy="810000"/>
           </a:xfrm>
           <a:prstGeom prst="rect">
             <a:avLst/>
@@ -22300,7 +22403,7 @@
         <p:spPr>
           <a:xfrm>
             <a:off x="674280" y="1399680"/>
-            <a:ext cx="7866720" cy="4409280"/>
+            <a:ext cx="7866360" cy="4408920"/>
           </a:xfrm>
           <a:prstGeom prst="rect">
             <a:avLst/>
@@ -22321,7 +22424,7 @@
             <a:normAutofit/>
           </a:bodyPr>
           <a:p>
-            <a:pPr marL="342720" indent="-336960">
+            <a:pPr marL="342720" indent="-336600">
               <a:lnSpc>
                 <a:spcPct val="100000"/>
               </a:lnSpc>
@@ -22357,7 +22460,7 @@
             </a:endParaRPr>
           </a:p>
           <a:p>
-            <a:pPr marL="742680" indent="-279720">
+            <a:pPr marL="742680" indent="-279360">
               <a:lnSpc>
                 <a:spcPct val="100000"/>
               </a:lnSpc>
@@ -22403,7 +22506,7 @@
             </a:endParaRPr>
           </a:p>
           <a:p>
-            <a:pPr marL="342720" indent="-336960">
+            <a:pPr marL="342720" indent="-336600">
               <a:lnSpc>
                 <a:spcPct val="100000"/>
               </a:lnSpc>
@@ -22419,7 +22522,7 @@
             </a:endParaRPr>
           </a:p>
           <a:p>
-            <a:pPr marL="342720" indent="-336960">
+            <a:pPr marL="342720" indent="-336600">
               <a:lnSpc>
                 <a:spcPct val="100000"/>
               </a:lnSpc>
@@ -22455,7 +22558,7 @@
             </a:endParaRPr>
           </a:p>
           <a:p>
-            <a:pPr marL="342720" indent="-336960">
+            <a:pPr marL="342720" indent="-336600">
               <a:lnSpc>
                 <a:spcPct val="100000"/>
               </a:lnSpc>
@@ -22491,7 +22594,7 @@
             </a:endParaRPr>
           </a:p>
           <a:p>
-            <a:pPr marL="342720" indent="-336960">
+            <a:pPr marL="342720" indent="-336600">
               <a:lnSpc>
                 <a:spcPct val="100000"/>
               </a:lnSpc>
@@ -22507,7 +22610,7 @@
             </a:endParaRPr>
           </a:p>
           <a:p>
-            <a:pPr marL="342720" indent="-336960">
+            <a:pPr marL="342720" indent="-336600">
               <a:lnSpc>
                 <a:spcPct val="100000"/>
               </a:lnSpc>
@@ -22633,7 +22736,7 @@
         <p:spPr>
           <a:xfrm>
             <a:off x="611280" y="259920"/>
-            <a:ext cx="7864920" cy="808560"/>
+            <a:ext cx="7864560" cy="808200"/>
           </a:xfrm>
           <a:prstGeom prst="rect">
             <a:avLst/>
@@ -22719,7 +22822,7 @@
         <p:spPr>
           <a:xfrm>
             <a:off x="674640" y="1400040"/>
-            <a:ext cx="7864920" cy="702360"/>
+            <a:ext cx="7864560" cy="702000"/>
           </a:xfrm>
           <a:prstGeom prst="rect">
             <a:avLst/>
@@ -22740,7 +22843,7 @@
             <a:normAutofit/>
           </a:bodyPr>
           <a:p>
-            <a:pPr marL="342720" indent="-338760">
+            <a:pPr marL="342720" indent="-338400">
               <a:lnSpc>
                 <a:spcPct val="100000"/>
               </a:lnSpc>
@@ -22780,7 +22883,7 @@
         <p:spPr>
           <a:xfrm>
             <a:off x="1143000" y="2576520"/>
-            <a:ext cx="1454760" cy="1348200"/>
+            <a:ext cx="1454400" cy="1347840"/>
           </a:xfrm>
           <a:prstGeom prst="rect">
             <a:avLst/>
@@ -22803,7 +22906,7 @@
         <p:spPr>
           <a:xfrm>
             <a:off x="1096920" y="4060800"/>
-            <a:ext cx="1553040" cy="1440360"/>
+            <a:ext cx="1552680" cy="1440000"/>
           </a:xfrm>
           <a:prstGeom prst="rect">
             <a:avLst/>
@@ -22822,7 +22925,7 @@
         <p:spPr>
           <a:xfrm>
             <a:off x="914400" y="2028960"/>
-            <a:ext cx="2651400" cy="516600"/>
+            <a:ext cx="2651040" cy="516240"/>
           </a:xfrm>
           <a:custGeom>
             <a:avLst/>
@@ -22931,7 +23034,7 @@
         <p:spPr>
           <a:xfrm>
             <a:off x="5394240" y="2028960"/>
-            <a:ext cx="2834280" cy="547920"/>
+            <a:ext cx="2833920" cy="547560"/>
           </a:xfrm>
           <a:custGeom>
             <a:avLst/>
@@ -23040,7 +23143,7 @@
         <p:spPr>
           <a:xfrm>
             <a:off x="5394240" y="3033720"/>
-            <a:ext cx="3016800" cy="1735560"/>
+            <a:ext cx="3016440" cy="1735200"/>
           </a:xfrm>
           <a:custGeom>
             <a:avLst/>
@@ -23181,7 +23284,7 @@
         <p:spPr>
           <a:xfrm>
             <a:off x="2598840" y="3308400"/>
-            <a:ext cx="2703960" cy="638640"/>
+            <a:ext cx="2703600" cy="638280"/>
           </a:xfrm>
           <a:custGeom>
             <a:avLst/>
@@ -23327,7 +23430,7 @@
         <p:spPr>
           <a:xfrm>
             <a:off x="611280" y="259920"/>
-            <a:ext cx="7920360" cy="864000"/>
+            <a:ext cx="7920000" cy="863640"/>
           </a:xfrm>
           <a:prstGeom prst="rect">
             <a:avLst/>
@@ -23415,7 +23518,7 @@
         <p:spPr>
           <a:xfrm>
             <a:off x="674280" y="1392120"/>
-            <a:ext cx="7920720" cy="4917240"/>
+            <a:ext cx="7920360" cy="4916880"/>
           </a:xfrm>
           <a:prstGeom prst="rect">
             <a:avLst/>
@@ -23598,7 +23701,7 @@
             </a:endParaRPr>
           </a:p>
           <a:p>
-            <a:pPr marL="228600" indent="-227520">
+            <a:pPr marL="228600" indent="-227160">
               <a:lnSpc>
                 <a:spcPct val="100000"/>
               </a:lnSpc>
@@ -23695,7 +23798,7 @@
             </a:endParaRPr>
           </a:p>
           <a:p>
-            <a:pPr marL="228600" indent="-227520">
+            <a:pPr marL="228600" indent="-227160">
               <a:lnSpc>
                 <a:spcPct val="100000"/>
               </a:lnSpc>
@@ -23813,7 +23916,7 @@
             </a:endParaRPr>
           </a:p>
           <a:p>
-            <a:pPr marL="228600" indent="-227520">
+            <a:pPr marL="228600" indent="-227160">
               <a:lnSpc>
                 <a:spcPct val="100000"/>
               </a:lnSpc>
@@ -23900,7 +24003,7 @@
             </a:endParaRPr>
           </a:p>
           <a:p>
-            <a:pPr marL="228600" indent="-183240">
+            <a:pPr marL="228600" indent="-182880">
               <a:lnSpc>
                 <a:spcPct val="100000"/>
               </a:lnSpc>
@@ -23963,7 +24066,7 @@
         <p:spPr>
           <a:xfrm>
             <a:off x="611280" y="260280"/>
-            <a:ext cx="7890120" cy="834120"/>
+            <a:ext cx="7889760" cy="833760"/>
           </a:xfrm>
           <a:prstGeom prst="rect">
             <a:avLst/>
@@ -24051,7 +24154,7 @@
         <p:spPr>
           <a:xfrm>
             <a:off x="674280" y="1399680"/>
-            <a:ext cx="7890480" cy="5366520"/>
+            <a:ext cx="7890120" cy="5366160"/>
           </a:xfrm>
           <a:prstGeom prst="rect">
             <a:avLst/>
@@ -24072,7 +24175,7 @@
             <a:normAutofit/>
           </a:bodyPr>
           <a:p>
-            <a:pPr marL="342720" indent="-313200">
+            <a:pPr marL="342720" indent="-312840">
               <a:lnSpc>
                 <a:spcPct val="100000"/>
               </a:lnSpc>
@@ -24118,7 +24221,7 @@
             </a:endParaRPr>
           </a:p>
           <a:p>
-            <a:pPr marL="342720" indent="-313200">
+            <a:pPr marL="342720" indent="-312840">
               <a:lnSpc>
                 <a:spcPct val="100000"/>
               </a:lnSpc>
@@ -24134,7 +24237,7 @@
             </a:endParaRPr>
           </a:p>
           <a:p>
-            <a:pPr marL="342720" indent="-313200" algn="ctr">
+            <a:pPr marL="342720" indent="-312840" algn="ctr">
               <a:lnSpc>
                 <a:spcPct val="100000"/>
               </a:lnSpc>
@@ -24160,7 +24263,7 @@
             </a:endParaRPr>
           </a:p>
           <a:p>
-            <a:pPr marL="342720" indent="-313200">
+            <a:pPr marL="342720" indent="-312840">
               <a:lnSpc>
                 <a:spcPct val="100000"/>
               </a:lnSpc>
@@ -24176,7 +24279,7 @@
             </a:endParaRPr>
           </a:p>
           <a:p>
-            <a:pPr marL="342720" indent="-313200">
+            <a:pPr marL="342720" indent="-312840">
               <a:lnSpc>
                 <a:spcPct val="100000"/>
               </a:lnSpc>
@@ -24202,7 +24305,7 @@
             </a:endParaRPr>
           </a:p>
           <a:p>
-            <a:pPr marL="342720" indent="-313200">
+            <a:pPr marL="342720" indent="-312840">
               <a:lnSpc>
                 <a:spcPct val="100000"/>
               </a:lnSpc>
@@ -24218,7 +24321,7 @@
             </a:endParaRPr>
           </a:p>
           <a:p>
-            <a:pPr marL="342720" indent="-313200">
+            <a:pPr marL="342720" indent="-312840">
               <a:lnSpc>
                 <a:spcPct val="100000"/>
               </a:lnSpc>
@@ -24284,7 +24387,7 @@
             </a:endParaRPr>
           </a:p>
           <a:p>
-            <a:pPr marL="342720" indent="-313200">
+            <a:pPr marL="342720" indent="-312840">
               <a:lnSpc>
                 <a:spcPct val="100000"/>
               </a:lnSpc>
@@ -24300,7 +24403,7 @@
             </a:endParaRPr>
           </a:p>
           <a:p>
-            <a:pPr marL="342720" indent="-313200">
+            <a:pPr marL="342720" indent="-312840">
               <a:lnSpc>
                 <a:spcPct val="100000"/>
               </a:lnSpc>
@@ -24326,7 +24429,7 @@
             </a:endParaRPr>
           </a:p>
           <a:p>
-            <a:pPr marL="342720" indent="-313200">
+            <a:pPr marL="342720" indent="-312840">
               <a:lnSpc>
                 <a:spcPct val="100000"/>
               </a:lnSpc>
@@ -24389,7 +24492,7 @@
         <p:spPr>
           <a:xfrm>
             <a:off x="611280" y="260280"/>
-            <a:ext cx="7890120" cy="834120"/>
+            <a:ext cx="7889760" cy="833760"/>
           </a:xfrm>
           <a:prstGeom prst="rect">
             <a:avLst/>
@@ -24477,7 +24580,7 @@
         <p:spPr>
           <a:xfrm>
             <a:off x="674280" y="1399680"/>
-            <a:ext cx="7890480" cy="5366520"/>
+            <a:ext cx="7890120" cy="5366160"/>
           </a:xfrm>
           <a:prstGeom prst="rect">
             <a:avLst/>
@@ -24498,7 +24601,7 @@
             <a:normAutofit/>
           </a:bodyPr>
           <a:p>
-            <a:pPr marL="342720" indent="-313200">
+            <a:pPr marL="342720" indent="-312840">
               <a:lnSpc>
                 <a:spcPct val="100000"/>
               </a:lnSpc>
@@ -24524,7 +24627,7 @@
             </a:endParaRPr>
           </a:p>
           <a:p>
-            <a:pPr marL="342720" indent="-313200">
+            <a:pPr marL="342720" indent="-312840">
               <a:lnSpc>
                 <a:spcPct val="100000"/>
               </a:lnSpc>
@@ -24540,7 +24643,7 @@
             </a:endParaRPr>
           </a:p>
           <a:p>
-            <a:pPr marL="342720" indent="-313200">
+            <a:pPr marL="342720" indent="-312840">
               <a:lnSpc>
                 <a:spcPct val="100000"/>
               </a:lnSpc>
@@ -24566,7 +24669,7 @@
             </a:endParaRPr>
           </a:p>
           <a:p>
-            <a:pPr marL="342720" indent="-313200">
+            <a:pPr marL="342720" indent="-312840">
               <a:lnSpc>
                 <a:spcPct val="100000"/>
               </a:lnSpc>
@@ -24589,7 +24692,7 @@
             </a:endParaRPr>
           </a:p>
           <a:p>
-            <a:pPr marL="342720" indent="-313200">
+            <a:pPr marL="342720" indent="-312840">
               <a:lnSpc>
                 <a:spcPct val="100000"/>
               </a:lnSpc>
@@ -24612,7 +24715,7 @@
             </a:endParaRPr>
           </a:p>
           <a:p>
-            <a:pPr marL="342720" indent="-313200">
+            <a:pPr marL="342720" indent="-312840">
               <a:lnSpc>
                 <a:spcPct val="100000"/>
               </a:lnSpc>
@@ -24635,7 +24738,7 @@
             </a:endParaRPr>
           </a:p>
           <a:p>
-            <a:pPr marL="342720" indent="-313200">
+            <a:pPr marL="342720" indent="-312840">
               <a:lnSpc>
                 <a:spcPct val="100000"/>
               </a:lnSpc>
@@ -24658,7 +24761,7 @@
             </a:endParaRPr>
           </a:p>
           <a:p>
-            <a:pPr marL="342720" indent="-313200">
+            <a:pPr marL="342720" indent="-312840">
               <a:lnSpc>
                 <a:spcPct val="100000"/>
               </a:lnSpc>
@@ -24681,7 +24784,7 @@
             </a:endParaRPr>
           </a:p>
           <a:p>
-            <a:pPr marL="342720" indent="-313200">
+            <a:pPr marL="342720" indent="-312840">
               <a:lnSpc>
                 <a:spcPct val="100000"/>
               </a:lnSpc>
@@ -24704,7 +24807,7 @@
             </a:endParaRPr>
           </a:p>
           <a:p>
-            <a:pPr marL="342720" indent="-313200">
+            <a:pPr marL="342720" indent="-312840">
               <a:lnSpc>
                 <a:spcPct val="100000"/>
               </a:lnSpc>
@@ -24767,7 +24870,7 @@
         <p:spPr>
           <a:xfrm>
             <a:off x="611280" y="260280"/>
-            <a:ext cx="7890120" cy="834120"/>
+            <a:ext cx="7889760" cy="833760"/>
           </a:xfrm>
           <a:prstGeom prst="rect">
             <a:avLst/>
@@ -24855,7 +24958,7 @@
         <p:spPr>
           <a:xfrm>
             <a:off x="674280" y="1400040"/>
-            <a:ext cx="7890480" cy="5274360"/>
+            <a:ext cx="7890120" cy="5274000"/>
           </a:xfrm>
           <a:prstGeom prst="rect">
             <a:avLst/>
@@ -24876,7 +24979,7 @@
             <a:normAutofit/>
           </a:bodyPr>
           <a:p>
-            <a:pPr marL="342720" indent="-313200">
+            <a:pPr marL="342720" indent="-312840">
               <a:lnSpc>
                 <a:spcPct val="100000"/>
               </a:lnSpc>
@@ -24902,7 +25005,7 @@
             </a:endParaRPr>
           </a:p>
           <a:p>
-            <a:pPr marL="342720" indent="-313200">
+            <a:pPr marL="342720" indent="-312840">
               <a:lnSpc>
                 <a:spcPct val="100000"/>
               </a:lnSpc>
@@ -24918,7 +25021,7 @@
             </a:endParaRPr>
           </a:p>
           <a:p>
-            <a:pPr marL="342720" indent="-313200">
+            <a:pPr marL="342720" indent="-312840">
               <a:lnSpc>
                 <a:spcPct val="100000"/>
               </a:lnSpc>
@@ -24944,7 +25047,7 @@
             </a:endParaRPr>
           </a:p>
           <a:p>
-            <a:pPr marL="342720" indent="-313200">
+            <a:pPr marL="342720" indent="-312840">
               <a:lnSpc>
                 <a:spcPct val="100000"/>
               </a:lnSpc>
@@ -24960,7 +25063,7 @@
             </a:endParaRPr>
           </a:p>
           <a:p>
-            <a:pPr marL="342720" indent="-313200" algn="ctr">
+            <a:pPr marL="342720" indent="-312840" algn="ctr">
               <a:lnSpc>
                 <a:spcPct val="100000"/>
               </a:lnSpc>
@@ -24986,7 +25089,7 @@
             </a:endParaRPr>
           </a:p>
           <a:p>
-            <a:pPr marL="342720" indent="-313200">
+            <a:pPr marL="342720" indent="-312840">
               <a:lnSpc>
                 <a:spcPct val="100000"/>
               </a:lnSpc>
@@ -25002,7 +25105,7 @@
             </a:endParaRPr>
           </a:p>
           <a:p>
-            <a:pPr marL="342720" indent="-313200" algn="ctr">
+            <a:pPr marL="342720" indent="-312840" algn="ctr">
               <a:lnSpc>
                 <a:spcPct val="100000"/>
               </a:lnSpc>
@@ -25065,7 +25168,7 @@
         <p:spPr>
           <a:xfrm>
             <a:off x="611280" y="260280"/>
-            <a:ext cx="7890120" cy="834120"/>
+            <a:ext cx="7889760" cy="833760"/>
           </a:xfrm>
           <a:prstGeom prst="rect">
             <a:avLst/>
@@ -25153,7 +25256,7 @@
         <p:spPr>
           <a:xfrm>
             <a:off x="674280" y="1400040"/>
-            <a:ext cx="7890480" cy="5274360"/>
+            <a:ext cx="7890120" cy="5274000"/>
           </a:xfrm>
           <a:prstGeom prst="rect">
             <a:avLst/>
@@ -25174,7 +25277,7 @@
             <a:normAutofit/>
           </a:bodyPr>
           <a:p>
-            <a:pPr marL="342720" indent="-313200">
+            <a:pPr marL="342720" indent="-312840">
               <a:lnSpc>
                 <a:spcPct val="100000"/>
               </a:lnSpc>
@@ -25200,7 +25303,7 @@
             </a:endParaRPr>
           </a:p>
           <a:p>
-            <a:pPr marL="342720" indent="-313200">
+            <a:pPr marL="342720" indent="-312840">
               <a:lnSpc>
                 <a:spcPct val="100000"/>
               </a:lnSpc>
@@ -25288,7 +25391,7 @@
             </a:endParaRPr>
           </a:p>
           <a:p>
-            <a:pPr marL="342720" indent="-313200">
+            <a:pPr marL="342720" indent="-312840">
               <a:lnSpc>
                 <a:spcPct val="100000"/>
               </a:lnSpc>
@@ -25314,7 +25417,7 @@
             </a:endParaRPr>
           </a:p>
           <a:p>
-            <a:pPr marL="342720" indent="-313200">
+            <a:pPr marL="342720" indent="-312840">
               <a:lnSpc>
                 <a:spcPct val="100000"/>
               </a:lnSpc>
@@ -25340,7 +25443,7 @@
             </a:endParaRPr>
           </a:p>
           <a:p>
-            <a:pPr marL="342720" indent="-313200">
+            <a:pPr marL="342720" indent="-312840">
               <a:lnSpc>
                 <a:spcPct val="100000"/>
               </a:lnSpc>
@@ -25376,7 +25479,7 @@
             </a:endParaRPr>
           </a:p>
           <a:p>
-            <a:pPr marL="342720" indent="-313200">
+            <a:pPr marL="342720" indent="-312840">
               <a:lnSpc>
                 <a:spcPct val="100000"/>
               </a:lnSpc>
@@ -25402,7 +25505,7 @@
             </a:endParaRPr>
           </a:p>
           <a:p>
-            <a:pPr marL="342720" indent="-313200">
+            <a:pPr marL="342720" indent="-312840">
               <a:lnSpc>
                 <a:spcPct val="100000"/>
               </a:lnSpc>
@@ -25438,7 +25541,7 @@
             </a:endParaRPr>
           </a:p>
           <a:p>
-            <a:pPr marL="342720" indent="-313200">
+            <a:pPr marL="342720" indent="-312840">
               <a:lnSpc>
                 <a:spcPct val="100000"/>
               </a:lnSpc>
@@ -25474,7 +25577,7 @@
             </a:endParaRPr>
           </a:p>
           <a:p>
-            <a:pPr marL="342720" indent="-313200">
+            <a:pPr marL="342720" indent="-312840">
               <a:lnSpc>
                 <a:spcPct val="100000"/>
               </a:lnSpc>

</xml_diff>